<commit_message>
Added notes for inheritance and LSP
</commit_message>
<xml_diff>
--- a/Lecture26-TemplateMethod/notes/rodham/Inheritance-Template_Method.pptx
+++ b/Lecture26-TemplateMethod/notes/rodham/Inheritance-Template_Method.pptx
@@ -5046,6 +5046,13 @@
   <p:clrMapOvr>
     <a:masterClrMapping/>
   </p:clrMapOvr>
+  <p:timing>
+    <p:tnLst>
+      <p:par>
+        <p:cTn id="1" dur="indefinite" restart="never" nodeType="tmRoot"/>
+      </p:par>
+    </p:tnLst>
+  </p:timing>
 </p:sld>
 </file>
 
@@ -8739,6 +8746,13 @@
   <p:clrMapOvr>
     <a:masterClrMapping/>
   </p:clrMapOvr>
+  <p:timing>
+    <p:tnLst>
+      <p:par>
+        <p:cTn id="1" dur="indefinite" restart="never" nodeType="tmRoot"/>
+      </p:par>
+    </p:tnLst>
+  </p:timing>
 </p:sld>
 </file>
 
@@ -9186,6 +9200,13 @@
   <p:clrMapOvr>
     <a:masterClrMapping/>
   </p:clrMapOvr>
+  <p:timing>
+    <p:tnLst>
+      <p:par>
+        <p:cTn id="1" dur="indefinite" restart="never" nodeType="tmRoot"/>
+      </p:par>
+    </p:tnLst>
+  </p:timing>
 </p:sld>
 </file>
 
@@ -9268,6 +9289,13 @@
   <p:clrMapOvr>
     <a:masterClrMapping/>
   </p:clrMapOvr>
+  <p:timing>
+    <p:tnLst>
+      <p:par>
+        <p:cTn id="1" dur="indefinite" restart="never" nodeType="tmRoot"/>
+      </p:par>
+    </p:tnLst>
+  </p:timing>
 </p:sld>
 </file>
 
@@ -9429,7 +9457,7 @@
             </a:r>
             <a:r>
               <a:rPr lang="en-US" sz="1200" dirty="0" err="1" smtClean="0"/>
-              <a:t>builder.headerString</a:t>
+              <a:t>headerString</a:t>
             </a:r>
             <a:r>
               <a:rPr lang="en-US" sz="1200" dirty="0" smtClean="0"/>
@@ -9479,7 +9507,7 @@
             </a:r>
             <a:r>
               <a:rPr lang="en-US" sz="1200" dirty="0" err="1" smtClean="0"/>
-              <a:t>builder.eachRentalString</a:t>
+              <a:t>eachRentalString</a:t>
             </a:r>
             <a:r>
               <a:rPr lang="en-US" sz="1200" dirty="0" smtClean="0"/>
@@ -9495,11 +9523,11 @@
           <a:p>
             <a:r>
               <a:rPr lang="en-US" sz="1200" dirty="0" smtClean="0"/>
-              <a:t>        result += </a:t>
-            </a:r>
-            <a:r>
-              <a:rPr lang="en-US" sz="1200" dirty="0" err="1" smtClean="0"/>
-              <a:t>builder.footerString</a:t>
+              <a:t>        result </a:t>
+            </a:r>
+            <a:r>
+              <a:rPr lang="en-US" sz="1200" smtClean="0"/>
+              <a:t>+= footerString</a:t>
             </a:r>
             <a:r>
               <a:rPr lang="en-US" sz="1200" dirty="0" smtClean="0"/>
@@ -9639,6 +9667,13 @@
   <p:clrMapOvr>
     <a:masterClrMapping/>
   </p:clrMapOvr>
+  <p:timing>
+    <p:tnLst>
+      <p:par>
+        <p:cTn id="1" dur="indefinite" restart="never" nodeType="tmRoot"/>
+      </p:par>
+    </p:tnLst>
+  </p:timing>
 </p:sld>
 </file>
 
@@ -9707,7 +9742,7 @@
           <a:graphicData uri="http://schemas.openxmlformats.org/presentationml/2006/ole">
             <mc:AlternateContent xmlns:mc="http://schemas.openxmlformats.org/markup-compatibility/2006">
               <mc:Choice xmlns:v="urn:schemas-microsoft-com:vml" Requires="v">
-                <p:oleObj spid="_x0000_s86021" name="VISIO" r:id="rId3" imgW="3440880" imgH="2469600" progId="Visio.Drawing.11">
+                <p:oleObj spid="_x0000_s86022" name="VISIO" r:id="rId3" imgW="3440880" imgH="2469600" progId="Visio.Drawing.11">
                   <p:embed/>
                 </p:oleObj>
               </mc:Choice>

</xml_diff>